<commit_message>
Api com login e logoff, classe abstrata, classe doador e controller do doador iniciais
</commit_message>
<xml_diff>
--- a/Sprint 1 - Entregavel de PI - Design de Interação.pptx
+++ b/Sprint 1 - Entregavel de PI - Design de Interação.pptx
@@ -207,7 +207,7 @@
           <a:p>
             <a:fld id="{8AC79F10-E06E-4CE2-A9B4-B99BB230B28A}" type="datetimeFigureOut">
               <a:rPr lang="pt-BR" smtClean="0"/>
-              <a:t>08/03/2022</a:t>
+              <a:t>09/03/2022</a:t>
             </a:fld>
             <a:endParaRPr lang="pt-BR"/>
           </a:p>
@@ -15247,6 +15247,76 @@
           </a:p>
         </p:txBody>
       </p:sp>
+      <p:sp>
+        <p:nvSpPr>
+          <p:cNvPr id="44" name="CaixaDeTexto 43">
+            <a:extLst>
+              <a:ext uri="{FF2B5EF4-FFF2-40B4-BE49-F238E27FC236}">
+                <a16:creationId xmlns:a16="http://schemas.microsoft.com/office/drawing/2014/main" id="{F8D9F0A4-6CBE-4259-96A2-8F7834B60F20}"/>
+              </a:ext>
+            </a:extLst>
+          </p:cNvPr>
+          <p:cNvSpPr txBox="1"/>
+          <p:nvPr/>
+        </p:nvSpPr>
+        <p:spPr>
+          <a:xfrm>
+            <a:off x="6872757" y="5538121"/>
+            <a:ext cx="3153824" cy="307777"/>
+          </a:xfrm>
+          <a:prstGeom prst="rect">
+            <a:avLst/>
+          </a:prstGeom>
+          <a:noFill/>
+        </p:spPr>
+        <p:txBody>
+          <a:bodyPr wrap="square" rtlCol="0">
+            <a:spAutoFit/>
+          </a:bodyPr>
+          <a:lstStyle/>
+          <a:p>
+            <a:r>
+              <a:rPr lang="pt-BR" sz="1400" dirty="0"/>
+              <a:t>Catálogo com ONGs menos populares</a:t>
+            </a:r>
+          </a:p>
+        </p:txBody>
+      </p:sp>
+      <p:sp>
+        <p:nvSpPr>
+          <p:cNvPr id="45" name="CaixaDeTexto 44">
+            <a:extLst>
+              <a:ext uri="{FF2B5EF4-FFF2-40B4-BE49-F238E27FC236}">
+                <a16:creationId xmlns:a16="http://schemas.microsoft.com/office/drawing/2014/main" id="{564D8782-0FA9-49AF-8135-4C90C1339119}"/>
+              </a:ext>
+            </a:extLst>
+          </p:cNvPr>
+          <p:cNvSpPr txBox="1"/>
+          <p:nvPr/>
+        </p:nvSpPr>
+        <p:spPr>
+          <a:xfrm>
+            <a:off x="6893224" y="5846520"/>
+            <a:ext cx="3153824" cy="307777"/>
+          </a:xfrm>
+          <a:prstGeom prst="rect">
+            <a:avLst/>
+          </a:prstGeom>
+          <a:noFill/>
+        </p:spPr>
+        <p:txBody>
+          <a:bodyPr wrap="square" rtlCol="0">
+            <a:spAutoFit/>
+          </a:bodyPr>
+          <a:lstStyle/>
+          <a:p>
+            <a:r>
+              <a:rPr lang="pt-BR" sz="1400" dirty="0"/>
+              <a:t>Facilitações para doações rápidas</a:t>
+            </a:r>
+          </a:p>
+        </p:txBody>
+      </p:sp>
     </p:spTree>
     <p:extLst>
       <p:ext uri="{BB962C8B-B14F-4D97-AF65-F5344CB8AC3E}">
@@ -16144,13 +16214,13 @@
 
 <file path=customXml/item1.xml><?xml version="1.0" encoding="utf-8"?>
 <Control xmlns="http://schemas.microsoft.com/VisualStudio/2011/storyboarding/control">
-  <Id Name="System.Storyboarding.Common.MousePointer" Revision="1" Stencil="System.Storyboarding.Common" StencilVersion="0.1"/>
+  <Id Name="System.Storyboarding.Common.Button" Revision="1" Stencil="System.Storyboarding.Common" StencilVersion="0.1"/>
 </Control>
 </file>
 
 <file path=customXml/item2.xml><?xml version="1.0" encoding="utf-8"?>
 <Control xmlns="http://schemas.microsoft.com/VisualStudio/2011/storyboarding/control">
-  <Id Name="System.Storyboarding.Common.Button" Revision="1" Stencil="System.Storyboarding.Common" StencilVersion="0.1"/>
+  <Id Name="System.Storyboarding.Common.MousePointer" Revision="1" Stencil="System.Storyboarding.Common" StencilVersion="0.1"/>
 </Control>
 </file>
 
@@ -16161,7 +16231,7 @@
 </file>
 
 <file path=customXml/itemProps1.xml><?xml version="1.0" encoding="utf-8"?>
-<ds:datastoreItem xmlns:ds="http://schemas.openxmlformats.org/officeDocument/2006/customXml" ds:itemID="{817C9E37-650B-4CCF-B951-DE51C8217DA2}">
+<ds:datastoreItem xmlns:ds="http://schemas.openxmlformats.org/officeDocument/2006/customXml" ds:itemID="{89972C15-A741-472E-B305-DD97487358F0}">
   <ds:schemaRefs>
     <ds:schemaRef ds:uri="http://schemas.microsoft.com/VisualStudio/2011/storyboarding/control"/>
   </ds:schemaRefs>
@@ -16169,7 +16239,7 @@
 </file>
 
 <file path=customXml/itemProps2.xml><?xml version="1.0" encoding="utf-8"?>
-<ds:datastoreItem xmlns:ds="http://schemas.openxmlformats.org/officeDocument/2006/customXml" ds:itemID="{89972C15-A741-472E-B305-DD97487358F0}">
+<ds:datastoreItem xmlns:ds="http://schemas.openxmlformats.org/officeDocument/2006/customXml" ds:itemID="{817C9E37-650B-4CCF-B951-DE51C8217DA2}">
   <ds:schemaRefs>
     <ds:schemaRef ds:uri="http://schemas.microsoft.com/VisualStudio/2011/storyboarding/control"/>
   </ds:schemaRefs>

</xml_diff>

<commit_message>
Add mapa de empatia ONG
</commit_message>
<xml_diff>
--- a/Sprint 1 - Entregavel de PI - Design de Interação.pptx
+++ b/Sprint 1 - Entregavel de PI - Design de Interação.pptx
@@ -5,7 +5,7 @@
     <p:sldMasterId id="2147483648" r:id="rId4"/>
   </p:sldMasterIdLst>
   <p:notesMasterIdLst>
-    <p:notesMasterId r:id="rId16"/>
+    <p:notesMasterId r:id="rId17"/>
   </p:notesMasterIdLst>
   <p:sldIdLst>
     <p:sldId id="257" r:id="rId5"/>
@@ -16,9 +16,10 @@
     <p:sldId id="965" r:id="rId10"/>
     <p:sldId id="974" r:id="rId11"/>
     <p:sldId id="971" r:id="rId12"/>
-    <p:sldId id="967" r:id="rId13"/>
-    <p:sldId id="972" r:id="rId14"/>
-    <p:sldId id="272" r:id="rId15"/>
+    <p:sldId id="975" r:id="rId13"/>
+    <p:sldId id="967" r:id="rId14"/>
+    <p:sldId id="972" r:id="rId15"/>
+    <p:sldId id="272" r:id="rId16"/>
   </p:sldIdLst>
   <p:sldSz cx="12192000" cy="6858000"/>
   <p:notesSz cx="6858000" cy="9144000"/>
@@ -125,6 +126,15 @@
 </p:presentation>
 </file>
 
+<file path=ppt/revisionInfo.xml><?xml version="1.0" encoding="utf-8"?>
+<p1510:revInfo xmlns:a="http://schemas.openxmlformats.org/drawingml/2006/main" xmlns:r="http://schemas.openxmlformats.org/officeDocument/2006/relationships" xmlns:p1510="http://schemas.microsoft.com/office/powerpoint/2015/10/main">
+  <p1510:revLst>
+    <p1510:client id="{4267B86B-DEAA-E29E-5FA6-0A9E1ED5FE75}" v="1" dt="2022-03-10T20:27:31.549"/>
+    <p1510:client id="{63FC8D37-96CB-6B7C-6F6F-18D4BFF12483}" v="512" dt="2022-03-10T22:41:59.698"/>
+  </p1510:revLst>
+</p1510:revInfo>
+</file>
+
 <file path=ppt/notesMasters/notesMaster1.xml><?xml version="1.0" encoding="utf-8"?>
 <p:notesMaster xmlns:a="http://schemas.openxmlformats.org/drawingml/2006/main" xmlns:r="http://schemas.openxmlformats.org/officeDocument/2006/relationships" xmlns:p="http://schemas.openxmlformats.org/presentationml/2006/main">
   <p:cSld>
@@ -207,7 +217,7 @@
           <a:p>
             <a:fld id="{8AC79F10-E06E-4CE2-A9B4-B99BB230B28A}" type="datetimeFigureOut">
               <a:rPr lang="pt-BR" smtClean="0"/>
-              <a:t>09/03/2022</a:t>
+              <a:t>10/03/2022</a:t>
             </a:fld>
             <a:endParaRPr lang="pt-BR"/>
           </a:p>
@@ -365,7 +375,7 @@
           <a:p>
             <a:fld id="{572AE4BF-7C7D-4125-B910-23CF7B33327F}" type="slidenum">
               <a:rPr lang="pt-BR" smtClean="0"/>
-              <a:t>‹nº›</a:t>
+              <a:t>‹#›</a:t>
             </a:fld>
             <a:endParaRPr lang="pt-BR"/>
           </a:p>
@@ -558,6 +568,90 @@
 </p:notes>
 </file>
 
+<file path=ppt/notesSlides/notesSlide10.xml><?xml version="1.0" encoding="utf-8"?>
+<p:notes xmlns:a="http://schemas.openxmlformats.org/drawingml/2006/main" xmlns:r="http://schemas.openxmlformats.org/officeDocument/2006/relationships" xmlns:p="http://schemas.openxmlformats.org/presentationml/2006/main">
+  <p:cSld>
+    <p:spTree>
+      <p:nvGrpSpPr>
+        <p:cNvPr id="1" name=""/>
+        <p:cNvGrpSpPr/>
+        <p:nvPr/>
+      </p:nvGrpSpPr>
+      <p:grpSpPr>
+        <a:xfrm>
+          <a:off x="0" y="0"/>
+          <a:ext cx="0" cy="0"/>
+          <a:chOff x="0" y="0"/>
+          <a:chExt cx="0" cy="0"/>
+        </a:xfrm>
+      </p:grpSpPr>
+      <p:sp>
+        <p:nvSpPr>
+          <p:cNvPr id="2" name="Espaço Reservado para Imagem de Slide 1"/>
+          <p:cNvSpPr>
+            <a:spLocks noGrp="1" noRot="1" noChangeAspect="1"/>
+          </p:cNvSpPr>
+          <p:nvPr>
+            <p:ph type="sldImg"/>
+          </p:nvPr>
+        </p:nvSpPr>
+        <p:spPr/>
+      </p:sp>
+      <p:sp>
+        <p:nvSpPr>
+          <p:cNvPr id="3" name="Espaço Reservado para Anotações 2"/>
+          <p:cNvSpPr>
+            <a:spLocks noGrp="1"/>
+          </p:cNvSpPr>
+          <p:nvPr>
+            <p:ph type="body" idx="1"/>
+          </p:nvPr>
+        </p:nvSpPr>
+        <p:spPr/>
+        <p:txBody>
+          <a:bodyPr/>
+          <a:lstStyle/>
+          <a:p>
+            <a:endParaRPr lang="pt-BR" dirty="0"/>
+          </a:p>
+        </p:txBody>
+      </p:sp>
+      <p:sp>
+        <p:nvSpPr>
+          <p:cNvPr id="4" name="Espaço Reservado para Número de Slide 3"/>
+          <p:cNvSpPr>
+            <a:spLocks noGrp="1"/>
+          </p:cNvSpPr>
+          <p:nvPr>
+            <p:ph type="sldNum" sz="quarter" idx="5"/>
+          </p:nvPr>
+        </p:nvSpPr>
+        <p:spPr/>
+        <p:txBody>
+          <a:bodyPr/>
+          <a:lstStyle/>
+          <a:p>
+            <a:fld id="{572AE4BF-7C7D-4125-B910-23CF7B33327F}" type="slidenum">
+              <a:rPr lang="pt-BR" smtClean="0"/>
+              <a:t>11</a:t>
+            </a:fld>
+            <a:endParaRPr lang="pt-BR"/>
+          </a:p>
+        </p:txBody>
+      </p:sp>
+    </p:spTree>
+    <p:extLst>
+      <p:ext uri="{BB962C8B-B14F-4D97-AF65-F5344CB8AC3E}">
+        <p14:creationId xmlns:p14="http://schemas.microsoft.com/office/powerpoint/2010/main" val="339815437"/>
+      </p:ext>
+    </p:extLst>
+  </p:cSld>
+  <p:clrMapOvr>
+    <a:masterClrMapping/>
+  </p:clrMapOvr>
+</p:notes>
+</file>
+
 <file path=ppt/notesSlides/notesSlide2.xml><?xml version="1.0" encoding="utf-8"?>
 <p:notes xmlns:a="http://schemas.openxmlformats.org/drawingml/2006/main" xmlns:r="http://schemas.openxmlformats.org/officeDocument/2006/relationships" xmlns:p="http://schemas.openxmlformats.org/presentationml/2006/main">
   <p:cSld>
@@ -1136,7 +1230,7 @@
     </p:spTree>
     <p:extLst>
       <p:ext uri="{BB962C8B-B14F-4D97-AF65-F5344CB8AC3E}">
-        <p14:creationId xmlns:p14="http://schemas.microsoft.com/office/powerpoint/2010/main" val="3171920704"/>
+        <p14:creationId xmlns:p14="http://schemas.microsoft.com/office/powerpoint/2010/main" val="4084117550"/>
       </p:ext>
     </p:extLst>
   </p:cSld>
@@ -1220,7 +1314,7 @@
     </p:spTree>
     <p:extLst>
       <p:ext uri="{BB962C8B-B14F-4D97-AF65-F5344CB8AC3E}">
-        <p14:creationId xmlns:p14="http://schemas.microsoft.com/office/powerpoint/2010/main" val="339815437"/>
+        <p14:creationId xmlns:p14="http://schemas.microsoft.com/office/powerpoint/2010/main" val="3171920704"/>
       </p:ext>
     </p:extLst>
   </p:cSld>
@@ -10482,6 +10576,380 @@
           <a:lstStyle/>
           <a:p>
             <a:r>
+              <a:rPr lang="pt-BR" dirty="0" err="1"/>
+              <a:t>Proto-Personas</a:t>
+            </a:r>
+            <a:r>
+              <a:rPr lang="pt-BR" dirty="0"/>
+              <a:t> – Justificativa</a:t>
+            </a:r>
+          </a:p>
+        </p:txBody>
+      </p:sp>
+      <p:sp>
+        <p:nvSpPr>
+          <p:cNvPr id="7" name="Espaço Reservado para Texto 1">
+            <a:extLst>
+              <a:ext uri="{FF2B5EF4-FFF2-40B4-BE49-F238E27FC236}">
+                <a16:creationId xmlns:a16="http://schemas.microsoft.com/office/drawing/2014/main" id="{F9D95787-7AD5-4499-8A51-1249CD4C4B8F}"/>
+              </a:ext>
+            </a:extLst>
+          </p:cNvPr>
+          <p:cNvSpPr txBox="1">
+            <a:spLocks/>
+          </p:cNvSpPr>
+          <p:nvPr/>
+        </p:nvSpPr>
+        <p:spPr>
+          <a:xfrm>
+            <a:off x="672352" y="1064734"/>
+            <a:ext cx="10273806" cy="4993165"/>
+          </a:xfrm>
+          <a:prstGeom prst="rect">
+            <a:avLst/>
+          </a:prstGeom>
+        </p:spPr>
+        <p:txBody>
+          <a:bodyPr/>
+          <a:lstStyle>
+            <a:lvl1pPr marL="228600" indent="-228600" algn="l" defTabSz="914400" rtl="0" eaLnBrk="1" latinLnBrk="0" hangingPunct="1">
+              <a:lnSpc>
+                <a:spcPct val="90000"/>
+              </a:lnSpc>
+              <a:spcBef>
+                <a:spcPts val="1000"/>
+              </a:spcBef>
+              <a:buFont typeface="Arial" panose="020B0604020202020204" pitchFamily="34" charset="0"/>
+              <a:buChar char="•"/>
+              <a:defRPr sz="2800" kern="1200">
+                <a:solidFill>
+                  <a:schemeClr val="tx1"/>
+                </a:solidFill>
+                <a:latin typeface="+mn-lt"/>
+                <a:ea typeface="+mn-ea"/>
+                <a:cs typeface="+mn-cs"/>
+              </a:defRPr>
+            </a:lvl1pPr>
+            <a:lvl2pPr marL="685800" indent="-228600" algn="l" defTabSz="914400" rtl="0" eaLnBrk="1" latinLnBrk="0" hangingPunct="1">
+              <a:lnSpc>
+                <a:spcPct val="90000"/>
+              </a:lnSpc>
+              <a:spcBef>
+                <a:spcPts val="500"/>
+              </a:spcBef>
+              <a:buFont typeface="Arial" panose="020B0604020202020204" pitchFamily="34" charset="0"/>
+              <a:buChar char="•"/>
+              <a:defRPr sz="2400" kern="1200">
+                <a:solidFill>
+                  <a:schemeClr val="tx1"/>
+                </a:solidFill>
+                <a:latin typeface="+mn-lt"/>
+                <a:ea typeface="+mn-ea"/>
+                <a:cs typeface="+mn-cs"/>
+              </a:defRPr>
+            </a:lvl2pPr>
+            <a:lvl3pPr marL="1143000" indent="-228600" algn="l" defTabSz="914400" rtl="0" eaLnBrk="1" latinLnBrk="0" hangingPunct="1">
+              <a:lnSpc>
+                <a:spcPct val="90000"/>
+              </a:lnSpc>
+              <a:spcBef>
+                <a:spcPts val="500"/>
+              </a:spcBef>
+              <a:buFont typeface="Arial" panose="020B0604020202020204" pitchFamily="34" charset="0"/>
+              <a:buChar char="•"/>
+              <a:defRPr sz="2000" kern="1200">
+                <a:solidFill>
+                  <a:schemeClr val="tx1"/>
+                </a:solidFill>
+                <a:latin typeface="+mn-lt"/>
+                <a:ea typeface="+mn-ea"/>
+                <a:cs typeface="+mn-cs"/>
+              </a:defRPr>
+            </a:lvl3pPr>
+            <a:lvl4pPr marL="1600200" indent="-228600" algn="l" defTabSz="914400" rtl="0" eaLnBrk="1" latinLnBrk="0" hangingPunct="1">
+              <a:lnSpc>
+                <a:spcPct val="90000"/>
+              </a:lnSpc>
+              <a:spcBef>
+                <a:spcPts val="500"/>
+              </a:spcBef>
+              <a:buFont typeface="Arial" panose="020B0604020202020204" pitchFamily="34" charset="0"/>
+              <a:buChar char="•"/>
+              <a:defRPr sz="1800" kern="1200">
+                <a:solidFill>
+                  <a:schemeClr val="tx1"/>
+                </a:solidFill>
+                <a:latin typeface="+mn-lt"/>
+                <a:ea typeface="+mn-ea"/>
+                <a:cs typeface="+mn-cs"/>
+              </a:defRPr>
+            </a:lvl4pPr>
+            <a:lvl5pPr marL="2057400" indent="-228600" algn="l" defTabSz="914400" rtl="0" eaLnBrk="1" latinLnBrk="0" hangingPunct="1">
+              <a:lnSpc>
+                <a:spcPct val="90000"/>
+              </a:lnSpc>
+              <a:spcBef>
+                <a:spcPts val="500"/>
+              </a:spcBef>
+              <a:buFont typeface="Arial" panose="020B0604020202020204" pitchFamily="34" charset="0"/>
+              <a:buChar char="•"/>
+              <a:defRPr sz="1800" kern="1200">
+                <a:solidFill>
+                  <a:schemeClr val="tx1"/>
+                </a:solidFill>
+                <a:latin typeface="+mn-lt"/>
+                <a:ea typeface="+mn-ea"/>
+                <a:cs typeface="+mn-cs"/>
+              </a:defRPr>
+            </a:lvl5pPr>
+            <a:lvl6pPr marL="2514600" indent="-228600" algn="l" defTabSz="914400" rtl="0" eaLnBrk="1" latinLnBrk="0" hangingPunct="1">
+              <a:lnSpc>
+                <a:spcPct val="90000"/>
+              </a:lnSpc>
+              <a:spcBef>
+                <a:spcPts val="500"/>
+              </a:spcBef>
+              <a:buFont typeface="Arial" panose="020B0604020202020204" pitchFamily="34" charset="0"/>
+              <a:buChar char="•"/>
+              <a:defRPr sz="1800" kern="1200">
+                <a:solidFill>
+                  <a:schemeClr val="tx1"/>
+                </a:solidFill>
+                <a:latin typeface="+mn-lt"/>
+                <a:ea typeface="+mn-ea"/>
+                <a:cs typeface="+mn-cs"/>
+              </a:defRPr>
+            </a:lvl6pPr>
+            <a:lvl7pPr marL="2971800" indent="-228600" algn="l" defTabSz="914400" rtl="0" eaLnBrk="1" latinLnBrk="0" hangingPunct="1">
+              <a:lnSpc>
+                <a:spcPct val="90000"/>
+              </a:lnSpc>
+              <a:spcBef>
+                <a:spcPts val="500"/>
+              </a:spcBef>
+              <a:buFont typeface="Arial" panose="020B0604020202020204" pitchFamily="34" charset="0"/>
+              <a:buChar char="•"/>
+              <a:defRPr sz="1800" kern="1200">
+                <a:solidFill>
+                  <a:schemeClr val="tx1"/>
+                </a:solidFill>
+                <a:latin typeface="+mn-lt"/>
+                <a:ea typeface="+mn-ea"/>
+                <a:cs typeface="+mn-cs"/>
+              </a:defRPr>
+            </a:lvl7pPr>
+            <a:lvl8pPr marL="3429000" indent="-228600" algn="l" defTabSz="914400" rtl="0" eaLnBrk="1" latinLnBrk="0" hangingPunct="1">
+              <a:lnSpc>
+                <a:spcPct val="90000"/>
+              </a:lnSpc>
+              <a:spcBef>
+                <a:spcPts val="500"/>
+              </a:spcBef>
+              <a:buFont typeface="Arial" panose="020B0604020202020204" pitchFamily="34" charset="0"/>
+              <a:buChar char="•"/>
+              <a:defRPr sz="1800" kern="1200">
+                <a:solidFill>
+                  <a:schemeClr val="tx1"/>
+                </a:solidFill>
+                <a:latin typeface="+mn-lt"/>
+                <a:ea typeface="+mn-ea"/>
+                <a:cs typeface="+mn-cs"/>
+              </a:defRPr>
+            </a:lvl8pPr>
+            <a:lvl9pPr marL="3886200" indent="-228600" algn="l" defTabSz="914400" rtl="0" eaLnBrk="1" latinLnBrk="0" hangingPunct="1">
+              <a:lnSpc>
+                <a:spcPct val="90000"/>
+              </a:lnSpc>
+              <a:spcBef>
+                <a:spcPts val="500"/>
+              </a:spcBef>
+              <a:buFont typeface="Arial" panose="020B0604020202020204" pitchFamily="34" charset="0"/>
+              <a:buChar char="•"/>
+              <a:defRPr sz="1800" kern="1200">
+                <a:solidFill>
+                  <a:schemeClr val="tx1"/>
+                </a:solidFill>
+                <a:latin typeface="+mn-lt"/>
+                <a:ea typeface="+mn-ea"/>
+                <a:cs typeface="+mn-cs"/>
+              </a:defRPr>
+            </a:lvl9pPr>
+          </a:lstStyle>
+          <a:p>
+            <a:pPr>
+              <a:lnSpc>
+                <a:spcPct val="150000"/>
+              </a:lnSpc>
+            </a:pPr>
+            <a:r>
+              <a:rPr lang="pt-BR" sz="2400" dirty="0">
+                <a:latin typeface="+mj-lt"/>
+              </a:rPr>
+              <a:t>Explique quais foram as análises realizadas para a definição da persona (</a:t>
+            </a:r>
+            <a:r>
+              <a:rPr lang="pt-BR" sz="2400" dirty="0" err="1">
+                <a:latin typeface="+mj-lt"/>
+              </a:rPr>
+              <a:t>Máx</a:t>
+            </a:r>
+            <a:r>
+              <a:rPr lang="pt-BR" sz="2400" dirty="0">
+                <a:latin typeface="+mj-lt"/>
+              </a:rPr>
+              <a:t> de 10 linhas).</a:t>
+            </a:r>
+          </a:p>
+          <a:p>
+            <a:pPr marL="0" indent="0">
+              <a:lnSpc>
+                <a:spcPct val="100000"/>
+              </a:lnSpc>
+              <a:buNone/>
+            </a:pPr>
+            <a:r>
+              <a:rPr lang="pt-BR" sz="2400" dirty="0">
+                <a:latin typeface="+mj-lt"/>
+              </a:rPr>
+              <a:t>Focamos em estudar pessoas de classe média para baixa, onde as mesma demonstram mais empatia com pessoas em extrema necessidade, visto que muitas delas tem a capacidade de se colocar no lugar das mesmas, mostrando interesse em doar, porém muitas não conseguem doar valores mais simbólicos, como valores mais altos, por serem de classe média para baixa a renda fica muito apertada e sobra pouco e por fim, relatam a falta de confiabilidade das ONGs com o seu dinheiro.</a:t>
+            </a:r>
+          </a:p>
+          <a:p>
+            <a:pPr marL="0" indent="0">
+              <a:lnSpc>
+                <a:spcPct val="150000"/>
+              </a:lnSpc>
+              <a:buNone/>
+            </a:pPr>
+            <a:endParaRPr lang="pt-BR" sz="2400" dirty="0">
+              <a:solidFill>
+                <a:srgbClr val="253746"/>
+              </a:solidFill>
+              <a:latin typeface="+mj-lt"/>
+            </a:endParaRPr>
+          </a:p>
+          <a:p>
+            <a:pPr marL="0" indent="0">
+              <a:lnSpc>
+                <a:spcPct val="150000"/>
+              </a:lnSpc>
+              <a:buFont typeface="Arial" panose="020B0604020202020204" pitchFamily="34" charset="0"/>
+              <a:buNone/>
+            </a:pPr>
+            <a:endParaRPr lang="pt-BR" sz="2400" dirty="0">
+              <a:solidFill>
+                <a:srgbClr val="253746"/>
+              </a:solidFill>
+              <a:latin typeface="+mj-lt"/>
+            </a:endParaRPr>
+          </a:p>
+          <a:p>
+            <a:pPr>
+              <a:lnSpc>
+                <a:spcPct val="150000"/>
+              </a:lnSpc>
+            </a:pPr>
+            <a:endParaRPr lang="pt-BR" sz="2400" dirty="0">
+              <a:solidFill>
+                <a:srgbClr val="253746"/>
+              </a:solidFill>
+              <a:latin typeface="+mj-lt"/>
+            </a:endParaRPr>
+          </a:p>
+          <a:p>
+            <a:pPr>
+              <a:lnSpc>
+                <a:spcPct val="150000"/>
+              </a:lnSpc>
+            </a:pPr>
+            <a:endParaRPr lang="pt-BR" sz="2400" dirty="0">
+              <a:solidFill>
+                <a:srgbClr val="253746"/>
+              </a:solidFill>
+              <a:latin typeface="+mj-lt"/>
+            </a:endParaRPr>
+          </a:p>
+          <a:p>
+            <a:pPr>
+              <a:lnSpc>
+                <a:spcPct val="150000"/>
+              </a:lnSpc>
+            </a:pPr>
+            <a:endParaRPr lang="pt-BR" sz="2400" dirty="0">
+              <a:latin typeface="+mj-lt"/>
+            </a:endParaRPr>
+          </a:p>
+        </p:txBody>
+      </p:sp>
+    </p:spTree>
+    <p:extLst>
+      <p:ext uri="{BB962C8B-B14F-4D97-AF65-F5344CB8AC3E}">
+        <p14:creationId xmlns:p14="http://schemas.microsoft.com/office/powerpoint/2010/main" val="3216955079"/>
+      </p:ext>
+    </p:extLst>
+  </p:cSld>
+  <p:clrMapOvr>
+    <a:masterClrMapping/>
+  </p:clrMapOvr>
+  <mc:AlternateContent xmlns:mc="http://schemas.openxmlformats.org/markup-compatibility/2006" xmlns:p159="http://schemas.microsoft.com/office/powerpoint/2015/09/main">
+    <mc:Choice Requires="p159">
+      <p:transition xmlns:p14="http://schemas.microsoft.com/office/powerpoint/2010/main" spd="slow" p14:dur="2000">
+        <p159:morph option="byObject"/>
+      </p:transition>
+    </mc:Choice>
+    <mc:Fallback xmlns="">
+      <p:transition spd="slow">
+        <p:fade/>
+      </p:transition>
+    </mc:Fallback>
+  </mc:AlternateContent>
+</p:sld>
+</file>
+
+<file path=ppt/slides/slide11.xml><?xml version="1.0" encoding="utf-8"?>
+<p:sld xmlns:a="http://schemas.openxmlformats.org/drawingml/2006/main" xmlns:r="http://schemas.openxmlformats.org/officeDocument/2006/relationships" xmlns:p="http://schemas.openxmlformats.org/presentationml/2006/main">
+  <p:cSld>
+    <p:spTree>
+      <p:nvGrpSpPr>
+        <p:cNvPr id="1" name=""/>
+        <p:cNvGrpSpPr/>
+        <p:nvPr/>
+      </p:nvGrpSpPr>
+      <p:grpSpPr>
+        <a:xfrm>
+          <a:off x="0" y="0"/>
+          <a:ext cx="0" cy="0"/>
+          <a:chOff x="0" y="0"/>
+          <a:chExt cx="0" cy="0"/>
+        </a:xfrm>
+      </p:grpSpPr>
+      <p:sp>
+        <p:nvSpPr>
+          <p:cNvPr id="6" name="Título 5">
+            <a:extLst>
+              <a:ext uri="{FF2B5EF4-FFF2-40B4-BE49-F238E27FC236}">
+                <a16:creationId xmlns:a16="http://schemas.microsoft.com/office/drawing/2014/main" id="{FBFC9F05-42CB-4663-9738-6A830E14BF9B}"/>
+              </a:ext>
+            </a:extLst>
+          </p:cNvPr>
+          <p:cNvSpPr>
+            <a:spLocks noGrp="1"/>
+          </p:cNvSpPr>
+          <p:nvPr>
+            <p:ph type="title"/>
+          </p:nvPr>
+        </p:nvSpPr>
+        <p:spPr>
+          <a:xfrm>
+            <a:off x="672352" y="50502"/>
+            <a:ext cx="10554448" cy="660473"/>
+          </a:xfrm>
+        </p:spPr>
+        <p:txBody>
+          <a:bodyPr/>
+          <a:lstStyle/>
+          <a:p>
+            <a:r>
               <a:rPr lang="pt-BR" dirty="0"/>
               <a:t>Jornada - Simplificada</a:t>
             </a:r>
@@ -10608,14 +11076,14 @@
         <p:spPr>
           <a:xfrm>
             <a:off x="3054600" y="1821034"/>
-            <a:ext cx="2037351" cy="923330"/>
-          </a:xfrm>
-          <a:prstGeom prst="rect">
-            <a:avLst/>
-          </a:prstGeom>
-        </p:spPr>
-        <p:txBody>
-          <a:bodyPr wrap="square">
+            <a:ext cx="2037351" cy="584775"/>
+          </a:xfrm>
+          <a:prstGeom prst="rect">
+            <a:avLst/>
+          </a:prstGeom>
+        </p:spPr>
+        <p:txBody>
+          <a:bodyPr wrap="square" lIns="91440" tIns="45720" rIns="91440" bIns="45720" anchor="t">
             <a:spAutoFit/>
           </a:bodyPr>
           <a:lstStyle/>
@@ -10625,14 +11093,11 @@
               <a:buChar char="•"/>
             </a:pPr>
             <a:r>
-              <a:rPr lang="pt-BR" dirty="0">
-                <a:latin typeface="Exo 2" panose="00000500000000000000" pitchFamily="50" charset="0"/>
+              <a:rPr lang="pt-BR" sz="1600" dirty="0">
+                <a:latin typeface="Exo 2"/>
               </a:rPr>
               <a:t>Realiza doação via cartão de crédito</a:t>
             </a:r>
-            <a:endParaRPr lang="pt-BR" sz="1800" dirty="0">
-              <a:latin typeface="Exo 2" panose="00000500000000000000" pitchFamily="50" charset="0"/>
-            </a:endParaRPr>
           </a:p>
         </p:txBody>
       </p:sp>
@@ -10885,14 +11350,14 @@
         <p:spPr>
           <a:xfrm>
             <a:off x="3142832" y="4267456"/>
-            <a:ext cx="2037351" cy="646331"/>
-          </a:xfrm>
-          <a:prstGeom prst="rect">
-            <a:avLst/>
-          </a:prstGeom>
-        </p:spPr>
-        <p:txBody>
-          <a:bodyPr wrap="square">
+            <a:ext cx="2037351" cy="584775"/>
+          </a:xfrm>
+          <a:prstGeom prst="rect">
+            <a:avLst/>
+          </a:prstGeom>
+        </p:spPr>
+        <p:txBody>
+          <a:bodyPr wrap="square" lIns="91440" tIns="45720" rIns="91440" bIns="45720" anchor="t">
             <a:spAutoFit/>
           </a:bodyPr>
           <a:lstStyle/>
@@ -10902,14 +11367,11 @@
               <a:buChar char="•"/>
             </a:pPr>
             <a:r>
-              <a:rPr lang="pt-BR" dirty="0">
-                <a:latin typeface="Exo 2" panose="00000500000000000000" pitchFamily="50" charset="0"/>
+              <a:rPr lang="pt-BR" sz="1600" dirty="0">
+                <a:latin typeface="Exo 2"/>
               </a:rPr>
               <a:t>Feliz em poder doar</a:t>
             </a:r>
-            <a:endParaRPr lang="pt-BR" sz="1800" dirty="0">
-              <a:latin typeface="Exo 2" panose="00000500000000000000" pitchFamily="50" charset="0"/>
-            </a:endParaRPr>
           </a:p>
         </p:txBody>
       </p:sp>
@@ -11494,7 +11956,7 @@
         </p:blipFill>
         <p:spPr>
           <a:xfrm>
-            <a:off x="9986277" y="2952800"/>
+            <a:off x="9986277" y="2980014"/>
             <a:ext cx="914400" cy="914400"/>
           </a:xfrm>
           <a:prstGeom prst="rect">
@@ -11556,8 +12018,8 @@
         </p:nvSpPr>
         <p:spPr>
           <a:xfrm>
-            <a:off x="7114676" y="1769199"/>
-            <a:ext cx="2022724" cy="1077218"/>
+            <a:off x="7128283" y="1769199"/>
+            <a:ext cx="2213224" cy="1090825"/>
           </a:xfrm>
           <a:prstGeom prst="rect">
             <a:avLst/>
@@ -11971,7 +12433,7 @@
 </p:sld>
 </file>
 
-<file path=ppt/slides/slide11.xml><?xml version="1.0" encoding="utf-8"?>
+<file path=ppt/slides/slide12.xml><?xml version="1.0" encoding="utf-8"?>
 <p:sld xmlns:a="http://schemas.openxmlformats.org/drawingml/2006/main" xmlns:r="http://schemas.openxmlformats.org/officeDocument/2006/relationships" xmlns:p="http://schemas.openxmlformats.org/presentationml/2006/main">
   <p:cSld>
     <p:spTree>
@@ -14114,12 +14576,12 @@
           </a:xfrm>
         </p:spPr>
         <p:txBody>
-          <a:bodyPr/>
+          <a:bodyPr lIns="91440" tIns="45720" rIns="91440" bIns="45720" anchor="t"/>
           <a:lstStyle/>
           <a:p>
             <a:r>
               <a:rPr lang="pt-BR" dirty="0"/>
-              <a:t>Mapa de Empatia – Em Socioemocional</a:t>
+              <a:t>Mapa de Empatia Doador – Em Socioemocional</a:t>
             </a:r>
           </a:p>
         </p:txBody>
@@ -15382,319 +15844,1137 @@
           </a:xfrm>
         </p:spPr>
         <p:txBody>
-          <a:bodyPr/>
-          <a:lstStyle/>
-          <a:p>
-            <a:r>
-              <a:rPr lang="pt-BR" dirty="0" err="1"/>
-              <a:t>Proto-Personas</a:t>
-            </a:r>
+          <a:bodyPr lIns="91440" tIns="45720" rIns="91440" bIns="45720" anchor="t"/>
+          <a:lstStyle/>
+          <a:p>
             <a:r>
               <a:rPr lang="pt-BR" dirty="0"/>
-              <a:t> – Justificativa</a:t>
-            </a:r>
-          </a:p>
-        </p:txBody>
-      </p:sp>
-      <p:sp>
-        <p:nvSpPr>
-          <p:cNvPr id="7" name="Espaço Reservado para Texto 1">
-            <a:extLst>
-              <a:ext uri="{FF2B5EF4-FFF2-40B4-BE49-F238E27FC236}">
-                <a16:creationId xmlns:a16="http://schemas.microsoft.com/office/drawing/2014/main" id="{F9D95787-7AD5-4499-8A51-1249CD4C4B8F}"/>
-              </a:ext>
-            </a:extLst>
-          </p:cNvPr>
-          <p:cNvSpPr txBox="1">
-            <a:spLocks/>
-          </p:cNvSpPr>
+              <a:t>Mapa de Empatia ONG – Em Socioemocional</a:t>
+            </a:r>
+          </a:p>
+        </p:txBody>
+      </p:sp>
+      <p:pic>
+        <p:nvPicPr>
+          <p:cNvPr id="4" name="Imagem 3" descr="Uma imagem contendo texto, mapa&#10;&#10;Descrição gerada automaticamente">
+            <a:extLst>
+              <a:ext uri="{FF2B5EF4-FFF2-40B4-BE49-F238E27FC236}">
+                <a16:creationId xmlns:a16="http://schemas.microsoft.com/office/drawing/2014/main" id="{0EA527A7-64DB-474B-B190-E6F53746BC4A}"/>
+              </a:ext>
+            </a:extLst>
+          </p:cNvPr>
+          <p:cNvPicPr>
+            <a:picLocks noChangeAspect="1"/>
+          </p:cNvPicPr>
           <p:nvPr/>
-        </p:nvSpPr>
-        <p:spPr>
-          <a:xfrm>
-            <a:off x="672352" y="1064734"/>
-            <a:ext cx="10273806" cy="4993165"/>
-          </a:xfrm>
-          <a:prstGeom prst="rect">
-            <a:avLst/>
-          </a:prstGeom>
-        </p:spPr>
-        <p:txBody>
-          <a:bodyPr/>
-          <a:lstStyle>
-            <a:lvl1pPr marL="228600" indent="-228600" algn="l" defTabSz="914400" rtl="0" eaLnBrk="1" latinLnBrk="0" hangingPunct="1">
-              <a:lnSpc>
-                <a:spcPct val="90000"/>
-              </a:lnSpc>
-              <a:spcBef>
-                <a:spcPts val="1000"/>
-              </a:spcBef>
-              <a:buFont typeface="Arial" panose="020B0604020202020204" pitchFamily="34" charset="0"/>
-              <a:buChar char="•"/>
-              <a:defRPr sz="2800" kern="1200">
-                <a:solidFill>
-                  <a:schemeClr val="tx1"/>
-                </a:solidFill>
-                <a:latin typeface="+mn-lt"/>
-                <a:ea typeface="+mn-ea"/>
-                <a:cs typeface="+mn-cs"/>
-              </a:defRPr>
-            </a:lvl1pPr>
-            <a:lvl2pPr marL="685800" indent="-228600" algn="l" defTabSz="914400" rtl="0" eaLnBrk="1" latinLnBrk="0" hangingPunct="1">
-              <a:lnSpc>
-                <a:spcPct val="90000"/>
-              </a:lnSpc>
-              <a:spcBef>
-                <a:spcPts val="500"/>
-              </a:spcBef>
-              <a:buFont typeface="Arial" panose="020B0604020202020204" pitchFamily="34" charset="0"/>
-              <a:buChar char="•"/>
-              <a:defRPr sz="2400" kern="1200">
-                <a:solidFill>
-                  <a:schemeClr val="tx1"/>
-                </a:solidFill>
-                <a:latin typeface="+mn-lt"/>
-                <a:ea typeface="+mn-ea"/>
-                <a:cs typeface="+mn-cs"/>
-              </a:defRPr>
-            </a:lvl2pPr>
-            <a:lvl3pPr marL="1143000" indent="-228600" algn="l" defTabSz="914400" rtl="0" eaLnBrk="1" latinLnBrk="0" hangingPunct="1">
-              <a:lnSpc>
-                <a:spcPct val="90000"/>
-              </a:lnSpc>
-              <a:spcBef>
-                <a:spcPts val="500"/>
-              </a:spcBef>
-              <a:buFont typeface="Arial" panose="020B0604020202020204" pitchFamily="34" charset="0"/>
-              <a:buChar char="•"/>
-              <a:defRPr sz="2000" kern="1200">
-                <a:solidFill>
-                  <a:schemeClr val="tx1"/>
-                </a:solidFill>
-                <a:latin typeface="+mn-lt"/>
-                <a:ea typeface="+mn-ea"/>
-                <a:cs typeface="+mn-cs"/>
-              </a:defRPr>
-            </a:lvl3pPr>
-            <a:lvl4pPr marL="1600200" indent="-228600" algn="l" defTabSz="914400" rtl="0" eaLnBrk="1" latinLnBrk="0" hangingPunct="1">
-              <a:lnSpc>
-                <a:spcPct val="90000"/>
-              </a:lnSpc>
-              <a:spcBef>
-                <a:spcPts val="500"/>
-              </a:spcBef>
-              <a:buFont typeface="Arial" panose="020B0604020202020204" pitchFamily="34" charset="0"/>
-              <a:buChar char="•"/>
-              <a:defRPr sz="1800" kern="1200">
-                <a:solidFill>
-                  <a:schemeClr val="tx1"/>
-                </a:solidFill>
-                <a:latin typeface="+mn-lt"/>
-                <a:ea typeface="+mn-ea"/>
-                <a:cs typeface="+mn-cs"/>
-              </a:defRPr>
-            </a:lvl4pPr>
-            <a:lvl5pPr marL="2057400" indent="-228600" algn="l" defTabSz="914400" rtl="0" eaLnBrk="1" latinLnBrk="0" hangingPunct="1">
-              <a:lnSpc>
-                <a:spcPct val="90000"/>
-              </a:lnSpc>
-              <a:spcBef>
-                <a:spcPts val="500"/>
-              </a:spcBef>
-              <a:buFont typeface="Arial" panose="020B0604020202020204" pitchFamily="34" charset="0"/>
-              <a:buChar char="•"/>
-              <a:defRPr sz="1800" kern="1200">
-                <a:solidFill>
-                  <a:schemeClr val="tx1"/>
-                </a:solidFill>
-                <a:latin typeface="+mn-lt"/>
-                <a:ea typeface="+mn-ea"/>
-                <a:cs typeface="+mn-cs"/>
-              </a:defRPr>
-            </a:lvl5pPr>
-            <a:lvl6pPr marL="2514600" indent="-228600" algn="l" defTabSz="914400" rtl="0" eaLnBrk="1" latinLnBrk="0" hangingPunct="1">
-              <a:lnSpc>
-                <a:spcPct val="90000"/>
-              </a:lnSpc>
-              <a:spcBef>
-                <a:spcPts val="500"/>
-              </a:spcBef>
-              <a:buFont typeface="Arial" panose="020B0604020202020204" pitchFamily="34" charset="0"/>
-              <a:buChar char="•"/>
-              <a:defRPr sz="1800" kern="1200">
-                <a:solidFill>
-                  <a:schemeClr val="tx1"/>
-                </a:solidFill>
-                <a:latin typeface="+mn-lt"/>
-                <a:ea typeface="+mn-ea"/>
-                <a:cs typeface="+mn-cs"/>
-              </a:defRPr>
-            </a:lvl6pPr>
-            <a:lvl7pPr marL="2971800" indent="-228600" algn="l" defTabSz="914400" rtl="0" eaLnBrk="1" latinLnBrk="0" hangingPunct="1">
-              <a:lnSpc>
-                <a:spcPct val="90000"/>
-              </a:lnSpc>
-              <a:spcBef>
-                <a:spcPts val="500"/>
-              </a:spcBef>
-              <a:buFont typeface="Arial" panose="020B0604020202020204" pitchFamily="34" charset="0"/>
-              <a:buChar char="•"/>
-              <a:defRPr sz="1800" kern="1200">
-                <a:solidFill>
-                  <a:schemeClr val="tx1"/>
-                </a:solidFill>
-                <a:latin typeface="+mn-lt"/>
-                <a:ea typeface="+mn-ea"/>
-                <a:cs typeface="+mn-cs"/>
-              </a:defRPr>
-            </a:lvl7pPr>
-            <a:lvl8pPr marL="3429000" indent="-228600" algn="l" defTabSz="914400" rtl="0" eaLnBrk="1" latinLnBrk="0" hangingPunct="1">
-              <a:lnSpc>
-                <a:spcPct val="90000"/>
-              </a:lnSpc>
-              <a:spcBef>
-                <a:spcPts val="500"/>
-              </a:spcBef>
-              <a:buFont typeface="Arial" panose="020B0604020202020204" pitchFamily="34" charset="0"/>
-              <a:buChar char="•"/>
-              <a:defRPr sz="1800" kern="1200">
-                <a:solidFill>
-                  <a:schemeClr val="tx1"/>
-                </a:solidFill>
-                <a:latin typeface="+mn-lt"/>
-                <a:ea typeface="+mn-ea"/>
-                <a:cs typeface="+mn-cs"/>
-              </a:defRPr>
-            </a:lvl8pPr>
-            <a:lvl9pPr marL="3886200" indent="-228600" algn="l" defTabSz="914400" rtl="0" eaLnBrk="1" latinLnBrk="0" hangingPunct="1">
-              <a:lnSpc>
-                <a:spcPct val="90000"/>
-              </a:lnSpc>
-              <a:spcBef>
-                <a:spcPts val="500"/>
-              </a:spcBef>
-              <a:buFont typeface="Arial" panose="020B0604020202020204" pitchFamily="34" charset="0"/>
-              <a:buChar char="•"/>
-              <a:defRPr sz="1800" kern="1200">
-                <a:solidFill>
-                  <a:schemeClr val="tx1"/>
-                </a:solidFill>
-                <a:latin typeface="+mn-lt"/>
-                <a:ea typeface="+mn-ea"/>
-                <a:cs typeface="+mn-cs"/>
-              </a:defRPr>
-            </a:lvl9pPr>
-          </a:lstStyle>
-          <a:p>
-            <a:pPr>
-              <a:lnSpc>
-                <a:spcPct val="150000"/>
-              </a:lnSpc>
-            </a:pPr>
-            <a:r>
-              <a:rPr lang="pt-BR" sz="2400" dirty="0">
-                <a:latin typeface="+mj-lt"/>
+        </p:nvPicPr>
+        <p:blipFill>
+          <a:blip r:embed="rId3" cstate="email">
+            <a:extLst>
+              <a:ext uri="{28A0092B-C50C-407E-A947-70E740481C1C}">
+                <a14:useLocalDpi xmlns:a14="http://schemas.microsoft.com/office/drawing/2010/main"/>
+              </a:ext>
+            </a:extLst>
+          </a:blip>
+          <a:stretch>
+            <a:fillRect/>
+          </a:stretch>
+        </p:blipFill>
+        <p:spPr>
+          <a:xfrm>
+            <a:off x="1978060" y="710975"/>
+            <a:ext cx="8270671" cy="5847276"/>
+          </a:xfrm>
+          <a:prstGeom prst="rect">
+            <a:avLst/>
+          </a:prstGeom>
+        </p:spPr>
+      </p:pic>
+      <p:sp>
+        <p:nvSpPr>
+          <p:cNvPr id="3" name="CaixaDeTexto 2">
+            <a:extLst>
+              <a:ext uri="{FF2B5EF4-FFF2-40B4-BE49-F238E27FC236}">
+                <a16:creationId xmlns:a16="http://schemas.microsoft.com/office/drawing/2014/main" id="{AB26C11D-1087-406F-8F7C-A12FF4B067A6}"/>
+              </a:ext>
+            </a:extLst>
+          </p:cNvPr>
+          <p:cNvSpPr txBox="1"/>
+          <p:nvPr/>
+        </p:nvSpPr>
+        <p:spPr>
+          <a:xfrm>
+            <a:off x="2852382" y="710975"/>
+            <a:ext cx="1378424" cy="367198"/>
+          </a:xfrm>
+          <a:prstGeom prst="rect">
+            <a:avLst/>
+          </a:prstGeom>
+          <a:noFill/>
+        </p:spPr>
+        <p:txBody>
+          <a:bodyPr wrap="square" lIns="91440" tIns="45720" rIns="91440" bIns="45720" rtlCol="0" anchor="t">
+            <a:spAutoFit/>
+          </a:bodyPr>
+          <a:lstStyle/>
+          <a:p>
+            <a:r>
+              <a:rPr lang="pt-BR" dirty="0"/>
+              <a:t>Carla</a:t>
+            </a:r>
+          </a:p>
+        </p:txBody>
+      </p:sp>
+      <p:sp>
+        <p:nvSpPr>
+          <p:cNvPr id="5" name="CaixaDeTexto 4">
+            <a:extLst>
+              <a:ext uri="{FF2B5EF4-FFF2-40B4-BE49-F238E27FC236}">
+                <a16:creationId xmlns:a16="http://schemas.microsoft.com/office/drawing/2014/main" id="{ABDDC9DC-BA5B-40E9-A04D-734EC616E291}"/>
+              </a:ext>
+            </a:extLst>
+          </p:cNvPr>
+          <p:cNvSpPr txBox="1"/>
+          <p:nvPr/>
+        </p:nvSpPr>
+        <p:spPr>
+          <a:xfrm>
+            <a:off x="4981432" y="710975"/>
+            <a:ext cx="1114567" cy="369332"/>
+          </a:xfrm>
+          <a:prstGeom prst="rect">
+            <a:avLst/>
+          </a:prstGeom>
+          <a:noFill/>
+        </p:spPr>
+        <p:txBody>
+          <a:bodyPr wrap="square" rtlCol="0">
+            <a:spAutoFit/>
+          </a:bodyPr>
+          <a:lstStyle/>
+          <a:p>
+            <a:r>
+              <a:rPr lang="pt-BR" dirty="0"/>
+              <a:t>40 anos</a:t>
+            </a:r>
+          </a:p>
+        </p:txBody>
+      </p:sp>
+      <p:sp>
+        <p:nvSpPr>
+          <p:cNvPr id="7" name="CaixaDeTexto 6">
+            <a:extLst>
+              <a:ext uri="{FF2B5EF4-FFF2-40B4-BE49-F238E27FC236}">
+                <a16:creationId xmlns:a16="http://schemas.microsoft.com/office/drawing/2014/main" id="{A31AD990-0EEF-4F4E-A44E-9A29CD33B44A}"/>
+              </a:ext>
+            </a:extLst>
+          </p:cNvPr>
+          <p:cNvSpPr txBox="1"/>
+          <p:nvPr/>
+        </p:nvSpPr>
+        <p:spPr>
+          <a:xfrm>
+            <a:off x="7641898" y="4874384"/>
+            <a:ext cx="1775057" cy="307777"/>
+          </a:xfrm>
+          <a:prstGeom prst="rect">
+            <a:avLst/>
+          </a:prstGeom>
+          <a:noFill/>
+        </p:spPr>
+        <p:txBody>
+          <a:bodyPr wrap="square" lIns="91440" tIns="45720" rIns="91440" bIns="45720" rtlCol="0" anchor="t">
+            <a:spAutoFit/>
+          </a:bodyPr>
+          <a:lstStyle/>
+          <a:p>
+            <a:r>
+              <a:rPr lang="pt-BR" sz="1400" dirty="0"/>
+              <a:t>Arrecada Roupas</a:t>
+            </a:r>
+            <a:endParaRPr lang="en-US" dirty="0"/>
+          </a:p>
+        </p:txBody>
+      </p:sp>
+      <p:sp>
+        <p:nvSpPr>
+          <p:cNvPr id="15" name="CaixaDeTexto 14">
+            <a:extLst>
+              <a:ext uri="{FF2B5EF4-FFF2-40B4-BE49-F238E27FC236}">
+                <a16:creationId xmlns:a16="http://schemas.microsoft.com/office/drawing/2014/main" id="{C81D03EB-24B8-478D-91EB-19AE6149C1AF}"/>
+              </a:ext>
+            </a:extLst>
+          </p:cNvPr>
+          <p:cNvSpPr txBox="1"/>
+          <p:nvPr/>
+        </p:nvSpPr>
+        <p:spPr>
+          <a:xfrm>
+            <a:off x="6541362" y="4232086"/>
+            <a:ext cx="1775057" cy="307777"/>
+          </a:xfrm>
+          <a:prstGeom prst="rect">
+            <a:avLst/>
+          </a:prstGeom>
+          <a:noFill/>
+        </p:spPr>
+        <p:txBody>
+          <a:bodyPr wrap="square" lIns="91440" tIns="45720" rIns="91440" bIns="45720" rtlCol="0" anchor="t">
+            <a:spAutoFit/>
+          </a:bodyPr>
+          <a:lstStyle/>
+          <a:p>
+            <a:r>
+              <a:rPr lang="pt-BR" sz="1400" dirty="0"/>
+              <a:t>Com os ajudados</a:t>
+            </a:r>
+            <a:endParaRPr lang="en-US" dirty="0"/>
+          </a:p>
+        </p:txBody>
+      </p:sp>
+      <p:sp>
+        <p:nvSpPr>
+          <p:cNvPr id="17" name="CaixaDeTexto 16">
+            <a:extLst>
+              <a:ext uri="{FF2B5EF4-FFF2-40B4-BE49-F238E27FC236}">
+                <a16:creationId xmlns:a16="http://schemas.microsoft.com/office/drawing/2014/main" id="{89B2A1EE-B8A5-42FA-A783-CBCF687F1C46}"/>
+              </a:ext>
+            </a:extLst>
+          </p:cNvPr>
+          <p:cNvSpPr txBox="1"/>
+          <p:nvPr/>
+        </p:nvSpPr>
+        <p:spPr>
+          <a:xfrm>
+            <a:off x="5649126" y="4807339"/>
+            <a:ext cx="1775057" cy="307777"/>
+          </a:xfrm>
+          <a:prstGeom prst="rect">
+            <a:avLst/>
+          </a:prstGeom>
+          <a:noFill/>
+        </p:spPr>
+        <p:txBody>
+          <a:bodyPr wrap="square" lIns="91440" tIns="45720" rIns="91440" bIns="45720" rtlCol="0" anchor="t">
+            <a:spAutoFit/>
+          </a:bodyPr>
+          <a:lstStyle/>
+          <a:p>
+            <a:r>
+              <a:rPr lang="pt-BR" sz="1400" dirty="0"/>
+              <a:t>Faz marmitas</a:t>
+            </a:r>
+          </a:p>
+        </p:txBody>
+      </p:sp>
+      <p:sp>
+        <p:nvSpPr>
+          <p:cNvPr id="18" name="CaixaDeTexto 17">
+            <a:extLst>
+              <a:ext uri="{FF2B5EF4-FFF2-40B4-BE49-F238E27FC236}">
+                <a16:creationId xmlns:a16="http://schemas.microsoft.com/office/drawing/2014/main" id="{8FE3FE78-9005-4903-8D58-2DEB7334E4B6}"/>
+              </a:ext>
+            </a:extLst>
+          </p:cNvPr>
+          <p:cNvSpPr txBox="1"/>
+          <p:nvPr/>
+        </p:nvSpPr>
+        <p:spPr>
+          <a:xfrm>
+            <a:off x="7499440" y="2568620"/>
+            <a:ext cx="1775057" cy="523220"/>
+          </a:xfrm>
+          <a:prstGeom prst="rect">
+            <a:avLst/>
+          </a:prstGeom>
+          <a:noFill/>
+        </p:spPr>
+        <p:txBody>
+          <a:bodyPr wrap="square" lIns="91440" tIns="45720" rIns="91440" bIns="45720" rtlCol="0" anchor="t">
+            <a:spAutoFit/>
+          </a:bodyPr>
+          <a:lstStyle/>
+          <a:p>
+            <a:r>
+              <a:rPr lang="pt-BR" sz="1400" dirty="0"/>
+              <a:t>Ambientes de </a:t>
+            </a:r>
+            <a:r>
+              <a:rPr lang="pt-BR" sz="1400" dirty="0" err="1"/>
+              <a:t>Producao</a:t>
+            </a:r>
+          </a:p>
+        </p:txBody>
+      </p:sp>
+      <p:sp>
+        <p:nvSpPr>
+          <p:cNvPr id="19" name="CaixaDeTexto 18">
+            <a:extLst>
+              <a:ext uri="{FF2B5EF4-FFF2-40B4-BE49-F238E27FC236}">
+                <a16:creationId xmlns:a16="http://schemas.microsoft.com/office/drawing/2014/main" id="{E5F404B0-3237-423A-8E31-FCE2D3BCCF63}"/>
+              </a:ext>
+            </a:extLst>
+          </p:cNvPr>
+          <p:cNvSpPr txBox="1"/>
+          <p:nvPr/>
+        </p:nvSpPr>
+        <p:spPr>
+          <a:xfrm>
+            <a:off x="8439364" y="3427764"/>
+            <a:ext cx="1775057" cy="523220"/>
+          </a:xfrm>
+          <a:prstGeom prst="rect">
+            <a:avLst/>
+          </a:prstGeom>
+          <a:noFill/>
+        </p:spPr>
+        <p:txBody>
+          <a:bodyPr wrap="square" lIns="91440" tIns="45720" rIns="91440" bIns="45720" rtlCol="0" anchor="t">
+            <a:spAutoFit/>
+          </a:bodyPr>
+          <a:lstStyle/>
+          <a:p>
+            <a:r>
+              <a:rPr lang="pt-BR" sz="1400" dirty="0" err="1"/>
+              <a:t>Ausencia</a:t>
+            </a:r>
+            <a:r>
+              <a:rPr lang="pt-BR" sz="1400" dirty="0"/>
+              <a:t> de </a:t>
+            </a:r>
+            <a:r>
+              <a:rPr lang="pt-BR" sz="1400" dirty="0" err="1"/>
+              <a:t>Divulgacao</a:t>
+            </a:r>
+          </a:p>
+        </p:txBody>
+      </p:sp>
+      <p:sp>
+        <p:nvSpPr>
+          <p:cNvPr id="21" name="CaixaDeTexto 20">
+            <a:extLst>
+              <a:ext uri="{FF2B5EF4-FFF2-40B4-BE49-F238E27FC236}">
+                <a16:creationId xmlns:a16="http://schemas.microsoft.com/office/drawing/2014/main" id="{9D891A4E-15C7-4A9C-B98F-E83F043795F4}"/>
+              </a:ext>
+            </a:extLst>
+          </p:cNvPr>
+          <p:cNvSpPr txBox="1"/>
+          <p:nvPr/>
+        </p:nvSpPr>
+        <p:spPr>
+          <a:xfrm>
+            <a:off x="7801965" y="3678293"/>
+            <a:ext cx="682378" cy="307777"/>
+          </a:xfrm>
+          <a:prstGeom prst="rect">
+            <a:avLst/>
+          </a:prstGeom>
+          <a:noFill/>
+        </p:spPr>
+        <p:txBody>
+          <a:bodyPr wrap="square" lIns="91440" tIns="45720" rIns="91440" bIns="45720" rtlCol="0" anchor="t">
+            <a:spAutoFit/>
+          </a:bodyPr>
+          <a:lstStyle/>
+          <a:p>
+            <a:r>
+              <a:rPr lang="pt-BR" sz="1400" dirty="0"/>
+              <a:t>A rua</a:t>
+            </a:r>
+            <a:endParaRPr lang="en-US" dirty="0"/>
+          </a:p>
+        </p:txBody>
+      </p:sp>
+      <p:sp>
+        <p:nvSpPr>
+          <p:cNvPr id="22" name="CaixaDeTexto 21">
+            <a:extLst>
+              <a:ext uri="{FF2B5EF4-FFF2-40B4-BE49-F238E27FC236}">
+                <a16:creationId xmlns:a16="http://schemas.microsoft.com/office/drawing/2014/main" id="{EECC4C9A-1944-4907-A7A2-10007A2B4439}"/>
+              </a:ext>
+            </a:extLst>
+          </p:cNvPr>
+          <p:cNvSpPr txBox="1"/>
+          <p:nvPr/>
+        </p:nvSpPr>
+        <p:spPr>
+          <a:xfrm>
+            <a:off x="8327856" y="2193385"/>
+            <a:ext cx="1775057" cy="307777"/>
+          </a:xfrm>
+          <a:prstGeom prst="rect">
+            <a:avLst/>
+          </a:prstGeom>
+          <a:noFill/>
+        </p:spPr>
+        <p:txBody>
+          <a:bodyPr wrap="square" lIns="91440" tIns="45720" rIns="91440" bIns="45720" rtlCol="0" anchor="t">
+            <a:spAutoFit/>
+          </a:bodyPr>
+          <a:lstStyle/>
+          <a:p>
+            <a:r>
+              <a:rPr lang="pt-BR" sz="1400" dirty="0" err="1"/>
+              <a:t>Documentario</a:t>
+            </a:r>
+          </a:p>
+        </p:txBody>
+      </p:sp>
+      <p:sp>
+        <p:nvSpPr>
+          <p:cNvPr id="26" name="CaixaDeTexto 25">
+            <a:extLst>
+              <a:ext uri="{FF2B5EF4-FFF2-40B4-BE49-F238E27FC236}">
+                <a16:creationId xmlns:a16="http://schemas.microsoft.com/office/drawing/2014/main" id="{41EE03A2-9A09-4BF7-A6AA-420C35BCCB00}"/>
+              </a:ext>
+            </a:extLst>
+          </p:cNvPr>
+          <p:cNvSpPr txBox="1"/>
+          <p:nvPr/>
+        </p:nvSpPr>
+        <p:spPr>
+          <a:xfrm>
+            <a:off x="8286046" y="3061884"/>
+            <a:ext cx="2387098" cy="307777"/>
+          </a:xfrm>
+          <a:prstGeom prst="rect">
+            <a:avLst/>
+          </a:prstGeom>
+          <a:noFill/>
+        </p:spPr>
+        <p:txBody>
+          <a:bodyPr wrap="square" lIns="91440" tIns="45720" rIns="91440" bIns="45720" rtlCol="0" anchor="t">
+            <a:spAutoFit/>
+          </a:bodyPr>
+          <a:lstStyle/>
+          <a:p>
+            <a:r>
+              <a:rPr lang="pt-BR" sz="1400" dirty="0"/>
+              <a:t>Pessoas de Rua</a:t>
+            </a:r>
+          </a:p>
+        </p:txBody>
+      </p:sp>
+      <p:sp>
+        <p:nvSpPr>
+          <p:cNvPr id="36" name="CaixaDeTexto 35">
+            <a:extLst>
+              <a:ext uri="{FF2B5EF4-FFF2-40B4-BE49-F238E27FC236}">
+                <a16:creationId xmlns:a16="http://schemas.microsoft.com/office/drawing/2014/main" id="{C2F43DB1-D4BA-4D4B-AD41-2F3D5DCAB767}"/>
+              </a:ext>
+            </a:extLst>
+          </p:cNvPr>
+          <p:cNvSpPr txBox="1"/>
+          <p:nvPr/>
+        </p:nvSpPr>
+        <p:spPr>
+          <a:xfrm>
+            <a:off x="3206375" y="1243853"/>
+            <a:ext cx="1775057" cy="307777"/>
+          </a:xfrm>
+          <a:prstGeom prst="rect">
+            <a:avLst/>
+          </a:prstGeom>
+          <a:noFill/>
+        </p:spPr>
+        <p:txBody>
+          <a:bodyPr wrap="square" lIns="91440" tIns="45720" rIns="91440" bIns="45720" rtlCol="0" anchor="t">
+            <a:spAutoFit/>
+          </a:bodyPr>
+          <a:lstStyle/>
+          <a:p>
+            <a:r>
+              <a:rPr lang="pt-BR" sz="1400" dirty="0"/>
+              <a:t>Falta </a:t>
+            </a:r>
+            <a:r>
+              <a:rPr lang="pt-BR" sz="1400" dirty="0" err="1"/>
+              <a:t>Divulgacao</a:t>
+            </a:r>
+          </a:p>
+        </p:txBody>
+      </p:sp>
+      <p:sp>
+        <p:nvSpPr>
+          <p:cNvPr id="37" name="CaixaDeTexto 36">
+            <a:extLst>
+              <a:ext uri="{FF2B5EF4-FFF2-40B4-BE49-F238E27FC236}">
+                <a16:creationId xmlns:a16="http://schemas.microsoft.com/office/drawing/2014/main" id="{08E8CA2D-B029-4FBA-99AC-07C5B7DF8AAA}"/>
+              </a:ext>
+            </a:extLst>
+          </p:cNvPr>
+          <p:cNvSpPr txBox="1"/>
+          <p:nvPr/>
+        </p:nvSpPr>
+        <p:spPr>
+          <a:xfrm>
+            <a:off x="4774686" y="1217647"/>
+            <a:ext cx="2677418" cy="307777"/>
+          </a:xfrm>
+          <a:prstGeom prst="rect">
+            <a:avLst/>
+          </a:prstGeom>
+          <a:noFill/>
+        </p:spPr>
+        <p:txBody>
+          <a:bodyPr wrap="square" rtlCol="0">
+            <a:spAutoFit/>
+          </a:bodyPr>
+          <a:lstStyle/>
+          <a:p>
+            <a:r>
+              <a:rPr lang="pt-BR" sz="1400" dirty="0"/>
+              <a:t>Pensa que poderia ajudar mais</a:t>
+            </a:r>
+          </a:p>
+        </p:txBody>
+      </p:sp>
+      <p:sp>
+        <p:nvSpPr>
+          <p:cNvPr id="38" name="CaixaDeTexto 37">
+            <a:extLst>
+              <a:ext uri="{FF2B5EF4-FFF2-40B4-BE49-F238E27FC236}">
+                <a16:creationId xmlns:a16="http://schemas.microsoft.com/office/drawing/2014/main" id="{E0A83E4E-08AA-4E08-9D8D-268BB2F185E8}"/>
+              </a:ext>
+            </a:extLst>
+          </p:cNvPr>
+          <p:cNvSpPr txBox="1"/>
+          <p:nvPr/>
+        </p:nvSpPr>
+        <p:spPr>
+          <a:xfrm>
+            <a:off x="4528131" y="1901637"/>
+            <a:ext cx="2677418" cy="307777"/>
+          </a:xfrm>
+          <a:prstGeom prst="rect">
+            <a:avLst/>
+          </a:prstGeom>
+          <a:noFill/>
+        </p:spPr>
+        <p:txBody>
+          <a:bodyPr wrap="square" rtlCol="0">
+            <a:spAutoFit/>
+          </a:bodyPr>
+          <a:lstStyle/>
+          <a:p>
+            <a:r>
+              <a:rPr lang="pt-BR" sz="1400" dirty="0"/>
+              <a:t>Sente pena</a:t>
+            </a:r>
+          </a:p>
+        </p:txBody>
+      </p:sp>
+      <p:sp>
+        <p:nvSpPr>
+          <p:cNvPr id="39" name="CaixaDeTexto 38">
+            <a:extLst>
+              <a:ext uri="{FF2B5EF4-FFF2-40B4-BE49-F238E27FC236}">
+                <a16:creationId xmlns:a16="http://schemas.microsoft.com/office/drawing/2014/main" id="{FD135592-5CB3-4552-9B91-23326BEAD619}"/>
+              </a:ext>
+            </a:extLst>
+          </p:cNvPr>
+          <p:cNvSpPr txBox="1"/>
+          <p:nvPr/>
+        </p:nvSpPr>
+        <p:spPr>
+          <a:xfrm>
+            <a:off x="3704175" y="1572989"/>
+            <a:ext cx="1455343" cy="523220"/>
+          </a:xfrm>
+          <a:prstGeom prst="rect">
+            <a:avLst/>
+          </a:prstGeom>
+          <a:noFill/>
+        </p:spPr>
+        <p:txBody>
+          <a:bodyPr wrap="square" lIns="91440" tIns="45720" rIns="91440" bIns="45720" rtlCol="0" anchor="t">
+            <a:spAutoFit/>
+          </a:bodyPr>
+          <a:lstStyle/>
+          <a:p>
+            <a:r>
+              <a:rPr lang="pt-BR" sz="1400" dirty="0" err="1"/>
+              <a:t>Divulgacao</a:t>
+            </a:r>
+            <a:r>
+              <a:rPr lang="pt-BR" sz="1400" dirty="0"/>
+              <a:t> </a:t>
+            </a:r>
+            <a:r>
+              <a:rPr lang="pt-BR" sz="1400" dirty="0" err="1"/>
+              <a:t>nao</a:t>
+            </a:r>
+            <a:r>
+              <a:rPr lang="pt-BR" sz="1400" dirty="0"/>
+              <a:t> funciona</a:t>
+            </a:r>
+          </a:p>
+        </p:txBody>
+      </p:sp>
+      <p:sp>
+        <p:nvSpPr>
+          <p:cNvPr id="40" name="CaixaDeTexto 39">
+            <a:extLst>
+              <a:ext uri="{FF2B5EF4-FFF2-40B4-BE49-F238E27FC236}">
+                <a16:creationId xmlns:a16="http://schemas.microsoft.com/office/drawing/2014/main" id="{A04C0F4C-BBA1-45FC-864E-781FDF33EA1B}"/>
+              </a:ext>
+            </a:extLst>
+          </p:cNvPr>
+          <p:cNvSpPr txBox="1"/>
+          <p:nvPr/>
+        </p:nvSpPr>
+        <p:spPr>
+          <a:xfrm>
+            <a:off x="5399482" y="1686194"/>
+            <a:ext cx="2987485" cy="523220"/>
+          </a:xfrm>
+          <a:prstGeom prst="rect">
+            <a:avLst/>
+          </a:prstGeom>
+          <a:noFill/>
+        </p:spPr>
+        <p:txBody>
+          <a:bodyPr wrap="square" rtlCol="0">
+            <a:spAutoFit/>
+          </a:bodyPr>
+          <a:lstStyle/>
+          <a:p>
+            <a:pPr algn="ctr"/>
+            <a:r>
+              <a:rPr lang="pt-BR" sz="1400" dirty="0"/>
+              <a:t>Sente-se tocada com os projetos sociais</a:t>
+            </a:r>
+          </a:p>
+        </p:txBody>
+      </p:sp>
+      <p:sp>
+        <p:nvSpPr>
+          <p:cNvPr id="41" name="CaixaDeTexto 40">
+            <a:extLst>
+              <a:ext uri="{FF2B5EF4-FFF2-40B4-BE49-F238E27FC236}">
+                <a16:creationId xmlns:a16="http://schemas.microsoft.com/office/drawing/2014/main" id="{05A47088-6C58-425C-B7C3-8C61B3361C35}"/>
+              </a:ext>
+            </a:extLst>
+          </p:cNvPr>
+          <p:cNvSpPr txBox="1"/>
+          <p:nvPr/>
+        </p:nvSpPr>
+        <p:spPr>
+          <a:xfrm>
+            <a:off x="6872757" y="1265290"/>
+            <a:ext cx="2987485" cy="307777"/>
+          </a:xfrm>
+          <a:prstGeom prst="rect">
+            <a:avLst/>
+          </a:prstGeom>
+          <a:noFill/>
+        </p:spPr>
+        <p:txBody>
+          <a:bodyPr wrap="square" rtlCol="0">
+            <a:spAutoFit/>
+          </a:bodyPr>
+          <a:lstStyle/>
+          <a:p>
+            <a:pPr algn="ctr"/>
+            <a:r>
+              <a:rPr lang="pt-BR" sz="1400" dirty="0"/>
+              <a:t>Sente compaixão</a:t>
+            </a:r>
+          </a:p>
+        </p:txBody>
+      </p:sp>
+      <p:sp>
+        <p:nvSpPr>
+          <p:cNvPr id="42" name="CaixaDeTexto 41">
+            <a:extLst>
+              <a:ext uri="{FF2B5EF4-FFF2-40B4-BE49-F238E27FC236}">
+                <a16:creationId xmlns:a16="http://schemas.microsoft.com/office/drawing/2014/main" id="{53D62E2C-2E46-4E33-A521-E99DE1869751}"/>
+              </a:ext>
+            </a:extLst>
+          </p:cNvPr>
+          <p:cNvSpPr txBox="1"/>
+          <p:nvPr/>
+        </p:nvSpPr>
+        <p:spPr>
+          <a:xfrm>
+            <a:off x="2173415" y="5479991"/>
+            <a:ext cx="2582894" cy="738664"/>
+          </a:xfrm>
+          <a:prstGeom prst="rect">
+            <a:avLst/>
+          </a:prstGeom>
+          <a:noFill/>
+        </p:spPr>
+        <p:txBody>
+          <a:bodyPr wrap="square" lIns="91440" tIns="45720" rIns="91440" bIns="45720" rtlCol="0" anchor="t">
+            <a:spAutoFit/>
+          </a:bodyPr>
+          <a:lstStyle/>
+          <a:p>
+            <a:pPr algn="ctr"/>
+            <a:r>
+              <a:rPr lang="pt-BR" sz="1400" dirty="0"/>
+              <a:t>Passa muito tempo fazendo </a:t>
+            </a:r>
+            <a:r>
+              <a:rPr lang="pt-BR" sz="1400" dirty="0" err="1"/>
+              <a:t>acao</a:t>
+            </a:r>
+            <a:r>
+              <a:rPr lang="pt-BR" sz="1400" dirty="0"/>
+              <a:t>, n consegue planejar ou gerenciar a ong</a:t>
+            </a:r>
+          </a:p>
+        </p:txBody>
+      </p:sp>
+      <p:sp>
+        <p:nvSpPr>
+          <p:cNvPr id="44" name="CaixaDeTexto 43">
+            <a:extLst>
+              <a:ext uri="{FF2B5EF4-FFF2-40B4-BE49-F238E27FC236}">
+                <a16:creationId xmlns:a16="http://schemas.microsoft.com/office/drawing/2014/main" id="{F8D9F0A4-6CBE-4259-96A2-8F7834B60F20}"/>
+              </a:ext>
+            </a:extLst>
+          </p:cNvPr>
+          <p:cNvSpPr txBox="1"/>
+          <p:nvPr/>
+        </p:nvSpPr>
+        <p:spPr>
+          <a:xfrm>
+            <a:off x="6872757" y="5538121"/>
+            <a:ext cx="3153824" cy="307777"/>
+          </a:xfrm>
+          <a:prstGeom prst="rect">
+            <a:avLst/>
+          </a:prstGeom>
+          <a:noFill/>
+        </p:spPr>
+        <p:txBody>
+          <a:bodyPr wrap="square" rtlCol="0">
+            <a:spAutoFit/>
+          </a:bodyPr>
+          <a:lstStyle/>
+          <a:p>
+            <a:r>
+              <a:rPr lang="pt-BR" sz="1400" dirty="0"/>
+              <a:t>Catálogo com ONGs menos populares</a:t>
+            </a:r>
+          </a:p>
+        </p:txBody>
+      </p:sp>
+      <p:sp>
+        <p:nvSpPr>
+          <p:cNvPr id="45" name="CaixaDeTexto 44">
+            <a:extLst>
+              <a:ext uri="{FF2B5EF4-FFF2-40B4-BE49-F238E27FC236}">
+                <a16:creationId xmlns:a16="http://schemas.microsoft.com/office/drawing/2014/main" id="{564D8782-0FA9-49AF-8135-4C90C1339119}"/>
+              </a:ext>
+            </a:extLst>
+          </p:cNvPr>
+          <p:cNvSpPr txBox="1"/>
+          <p:nvPr/>
+        </p:nvSpPr>
+        <p:spPr>
+          <a:xfrm>
+            <a:off x="6893224" y="5846520"/>
+            <a:ext cx="3153824" cy="307777"/>
+          </a:xfrm>
+          <a:prstGeom prst="rect">
+            <a:avLst/>
+          </a:prstGeom>
+          <a:noFill/>
+        </p:spPr>
+        <p:txBody>
+          <a:bodyPr wrap="square" rtlCol="0">
+            <a:spAutoFit/>
+          </a:bodyPr>
+          <a:lstStyle/>
+          <a:p>
+            <a:r>
+              <a:rPr lang="pt-BR" sz="1400" dirty="0"/>
+              <a:t>Facilitações para doações rápidas</a:t>
+            </a:r>
+          </a:p>
+        </p:txBody>
+      </p:sp>
+      <p:sp>
+        <p:nvSpPr>
+          <p:cNvPr id="2" name="TextBox 1">
+            <a:extLst>
+              <a:ext uri="{FF2B5EF4-FFF2-40B4-BE49-F238E27FC236}">
+                <a16:creationId xmlns:a16="http://schemas.microsoft.com/office/drawing/2014/main" id="{2727B7D5-0F77-4905-8238-8A0F8D8E7885}"/>
+              </a:ext>
+            </a:extLst>
+          </p:cNvPr>
+          <p:cNvSpPr txBox="1"/>
+          <p:nvPr/>
+        </p:nvSpPr>
+        <p:spPr>
+          <a:xfrm>
+            <a:off x="4003222" y="4193721"/>
+            <a:ext cx="2743200" cy="369332"/>
+          </a:xfrm>
+          <a:prstGeom prst="rect">
+            <a:avLst/>
+          </a:prstGeom>
+          <a:noFill/>
+        </p:spPr>
+        <p:txBody>
+          <a:bodyPr rot="0" spcFirstLastPara="0" vertOverflow="overflow" horzOverflow="overflow" vert="horz" wrap="square" lIns="91440" tIns="45720" rIns="91440" bIns="45720" numCol="1" spcCol="0" rtlCol="0" fromWordArt="0" anchor="t" anchorCtr="0" forceAA="0" compatLnSpc="1">
+            <a:prstTxWarp prst="textNoShape">
+              <a:avLst/>
+            </a:prstTxWarp>
+            <a:spAutoFit/>
+          </a:bodyPr>
+          <a:lstStyle/>
+          <a:p>
+            <a:r>
+              <a:rPr lang="en-US" dirty="0"/>
+              <a:t>Com Pessoas da </a:t>
+            </a:r>
+            <a:r>
+              <a:rPr lang="en-US" dirty="0" err="1"/>
+              <a:t>regiao</a:t>
+            </a:r>
+            <a:r>
+              <a:rPr lang="en-US" dirty="0"/>
+              <a:t> </a:t>
+            </a:r>
+          </a:p>
+        </p:txBody>
+      </p:sp>
+      <p:sp>
+        <p:nvSpPr>
+          <p:cNvPr id="46" name="CaixaDeTexto 16">
+            <a:extLst>
+              <a:ext uri="{FF2B5EF4-FFF2-40B4-BE49-F238E27FC236}">
+                <a16:creationId xmlns:a16="http://schemas.microsoft.com/office/drawing/2014/main" id="{ED234EFC-48ED-4902-9BBE-7F78624359EE}"/>
+              </a:ext>
+            </a:extLst>
+          </p:cNvPr>
+          <p:cNvSpPr txBox="1"/>
+          <p:nvPr/>
+        </p:nvSpPr>
+        <p:spPr>
+          <a:xfrm>
+            <a:off x="2220125" y="2045089"/>
+            <a:ext cx="1775057" cy="307777"/>
+          </a:xfrm>
+          <a:prstGeom prst="rect">
+            <a:avLst/>
+          </a:prstGeom>
+          <a:noFill/>
+        </p:spPr>
+        <p:txBody>
+          <a:bodyPr wrap="square" lIns="91440" tIns="45720" rIns="91440" bIns="45720" rtlCol="0" anchor="t">
+            <a:spAutoFit/>
+          </a:bodyPr>
+          <a:lstStyle/>
+          <a:p>
+            <a:r>
+              <a:rPr lang="pt-BR" sz="1400" dirty="0"/>
+              <a:t>Os ajudados</a:t>
+            </a:r>
+            <a:r>
+              <a:rPr lang="pt-BR" sz="1400" dirty="0">
+                <a:ea typeface="+mn-lt"/>
+                <a:cs typeface="+mn-lt"/>
               </a:rPr>
-              <a:t>Explique quais foram as análises realizadas para a definição da persona (</a:t>
-            </a:r>
-            <a:r>
-              <a:rPr lang="pt-BR" sz="2400" dirty="0" err="1">
-                <a:latin typeface="+mj-lt"/>
-              </a:rPr>
-              <a:t>Máx</a:t>
-            </a:r>
-            <a:r>
-              <a:rPr lang="pt-BR" sz="2400" dirty="0">
-                <a:latin typeface="+mj-lt"/>
-              </a:rPr>
-              <a:t> de 10 linhas).</a:t>
-            </a:r>
-          </a:p>
-          <a:p>
-            <a:pPr marL="0" indent="0">
-              <a:lnSpc>
-                <a:spcPct val="100000"/>
-              </a:lnSpc>
-              <a:buNone/>
-            </a:pPr>
-            <a:r>
-              <a:rPr lang="pt-BR" sz="2400" dirty="0">
-                <a:latin typeface="+mj-lt"/>
-              </a:rPr>
-              <a:t>Focamos em estudar pessoas de classe média para baixa, onde as mesma demonstram mais empatia com pessoas em extrema necessidade, visto que muitas delas tem a capacidade de se colocar no lugar das mesmas, mostrando interesse em doar, porém muitas não conseguem doar valores mais simbólicos, como valores mais altos, por serem de classe média para baixa a renda fica muito apertada e sobra pouco e por fim, relatam a falta de confiabilidade das ONGs com o seu dinheiro.</a:t>
-            </a:r>
-          </a:p>
-          <a:p>
-            <a:pPr marL="0" indent="0">
-              <a:lnSpc>
-                <a:spcPct val="150000"/>
-              </a:lnSpc>
-              <a:buNone/>
-            </a:pPr>
-            <a:endParaRPr lang="pt-BR" sz="2400" dirty="0">
-              <a:solidFill>
-                <a:srgbClr val="253746"/>
-              </a:solidFill>
-              <a:latin typeface="+mj-lt"/>
-            </a:endParaRPr>
-          </a:p>
-          <a:p>
-            <a:pPr marL="0" indent="0">
-              <a:lnSpc>
-                <a:spcPct val="150000"/>
-              </a:lnSpc>
-              <a:buFont typeface="Arial" panose="020B0604020202020204" pitchFamily="34" charset="0"/>
-              <a:buNone/>
-            </a:pPr>
-            <a:endParaRPr lang="pt-BR" sz="2400" dirty="0">
-              <a:solidFill>
-                <a:srgbClr val="253746"/>
-              </a:solidFill>
-              <a:latin typeface="+mj-lt"/>
-            </a:endParaRPr>
-          </a:p>
-          <a:p>
-            <a:pPr>
-              <a:lnSpc>
-                <a:spcPct val="150000"/>
-              </a:lnSpc>
-            </a:pPr>
-            <a:endParaRPr lang="pt-BR" sz="2400" dirty="0">
-              <a:solidFill>
-                <a:srgbClr val="253746"/>
-              </a:solidFill>
-              <a:latin typeface="+mj-lt"/>
-            </a:endParaRPr>
-          </a:p>
-          <a:p>
-            <a:pPr>
-              <a:lnSpc>
-                <a:spcPct val="150000"/>
-              </a:lnSpc>
-            </a:pPr>
-            <a:endParaRPr lang="pt-BR" sz="2400" dirty="0">
-              <a:solidFill>
-                <a:srgbClr val="253746"/>
-              </a:solidFill>
-              <a:latin typeface="+mj-lt"/>
-            </a:endParaRPr>
-          </a:p>
-          <a:p>
-            <a:pPr>
-              <a:lnSpc>
-                <a:spcPct val="150000"/>
-              </a:lnSpc>
-            </a:pPr>
-            <a:endParaRPr lang="pt-BR" sz="2400" dirty="0">
-              <a:latin typeface="+mj-lt"/>
-            </a:endParaRPr>
+              <a:t> </a:t>
+            </a:r>
+            <a:endParaRPr lang="pt-BR" sz="1400" dirty="0"/>
+          </a:p>
+        </p:txBody>
+      </p:sp>
+      <p:sp>
+        <p:nvSpPr>
+          <p:cNvPr id="8" name="TextBox 7">
+            <a:extLst>
+              <a:ext uri="{FF2B5EF4-FFF2-40B4-BE49-F238E27FC236}">
+                <a16:creationId xmlns:a16="http://schemas.microsoft.com/office/drawing/2014/main" id="{B2A90476-5364-445A-B3CB-E4C5B925DCC3}"/>
+              </a:ext>
+            </a:extLst>
+          </p:cNvPr>
+          <p:cNvSpPr txBox="1"/>
+          <p:nvPr/>
+        </p:nvSpPr>
+        <p:spPr>
+          <a:xfrm>
+            <a:off x="2220686" y="2383971"/>
+            <a:ext cx="2743200" cy="369332"/>
+          </a:xfrm>
+          <a:prstGeom prst="rect">
+            <a:avLst/>
+          </a:prstGeom>
+          <a:noFill/>
+        </p:spPr>
+        <p:txBody>
+          <a:bodyPr rot="0" spcFirstLastPara="0" vertOverflow="overflow" horzOverflow="overflow" vert="horz" wrap="square" lIns="91440" tIns="45720" rIns="91440" bIns="45720" numCol="1" spcCol="0" rtlCol="0" fromWordArt="0" anchor="t" anchorCtr="0" forceAA="0" compatLnSpc="1">
+            <a:prstTxWarp prst="textNoShape">
+              <a:avLst/>
+            </a:prstTxWarp>
+            <a:spAutoFit/>
+          </a:bodyPr>
+          <a:lstStyle/>
+          <a:p>
+            <a:r>
+              <a:rPr lang="en-US" dirty="0"/>
+              <a:t>​Bons feedbacks</a:t>
+            </a:r>
+          </a:p>
+        </p:txBody>
+      </p:sp>
+      <p:sp>
+        <p:nvSpPr>
+          <p:cNvPr id="47" name="TextBox 46">
+            <a:extLst>
+              <a:ext uri="{FF2B5EF4-FFF2-40B4-BE49-F238E27FC236}">
+                <a16:creationId xmlns:a16="http://schemas.microsoft.com/office/drawing/2014/main" id="{AB4DE2CD-9C2B-45BF-B64B-9F4D322B9769}"/>
+              </a:ext>
+            </a:extLst>
+          </p:cNvPr>
+          <p:cNvSpPr txBox="1"/>
+          <p:nvPr/>
+        </p:nvSpPr>
+        <p:spPr>
+          <a:xfrm>
+            <a:off x="2166257" y="3431721"/>
+            <a:ext cx="2743200" cy="369332"/>
+          </a:xfrm>
+          <a:prstGeom prst="rect">
+            <a:avLst/>
+          </a:prstGeom>
+          <a:noFill/>
+        </p:spPr>
+        <p:txBody>
+          <a:bodyPr rot="0" spcFirstLastPara="0" vertOverflow="overflow" horzOverflow="overflow" vert="horz" wrap="square" lIns="91440" tIns="45720" rIns="91440" bIns="45720" numCol="1" spcCol="0" rtlCol="0" fromWordArt="0" anchor="t" anchorCtr="0" forceAA="0" compatLnSpc="1">
+            <a:prstTxWarp prst="textNoShape">
+              <a:avLst/>
+            </a:prstTxWarp>
+            <a:spAutoFit/>
+          </a:bodyPr>
+          <a:lstStyle/>
+          <a:p>
+            <a:r>
+              <a:rPr lang="en-US" dirty="0" err="1"/>
+              <a:t>Integrantes</a:t>
+            </a:r>
+            <a:r>
+              <a:rPr lang="en-US" dirty="0"/>
+              <a:t> da ONG</a:t>
+            </a:r>
+          </a:p>
+        </p:txBody>
+      </p:sp>
+      <p:sp>
+        <p:nvSpPr>
+          <p:cNvPr id="48" name="TextBox 47">
+            <a:extLst>
+              <a:ext uri="{FF2B5EF4-FFF2-40B4-BE49-F238E27FC236}">
+                <a16:creationId xmlns:a16="http://schemas.microsoft.com/office/drawing/2014/main" id="{C00111F5-4423-47B2-A2E4-C4A2BB303D76}"/>
+              </a:ext>
+            </a:extLst>
+          </p:cNvPr>
+          <p:cNvSpPr txBox="1"/>
+          <p:nvPr/>
+        </p:nvSpPr>
+        <p:spPr>
+          <a:xfrm>
+            <a:off x="3282043" y="4544426"/>
+            <a:ext cx="1334219" cy="369332"/>
+          </a:xfrm>
+          <a:prstGeom prst="rect">
+            <a:avLst/>
+          </a:prstGeom>
+          <a:noFill/>
+        </p:spPr>
+        <p:txBody>
+          <a:bodyPr rot="0" spcFirstLastPara="0" vertOverflow="overflow" horzOverflow="overflow" vert="horz" wrap="square" lIns="91440" tIns="45720" rIns="91440" bIns="45720" numCol="1" spcCol="0" rtlCol="0" fromWordArt="0" anchor="t" anchorCtr="0" forceAA="0" compatLnSpc="1">
+            <a:prstTxWarp prst="textNoShape">
+              <a:avLst/>
+            </a:prstTxWarp>
+            <a:spAutoFit/>
+          </a:bodyPr>
+          <a:lstStyle/>
+          <a:p>
+            <a:r>
+              <a:rPr lang="en-US" dirty="0" err="1"/>
+              <a:t>Divulgacao</a:t>
+            </a:r>
+            <a:r>
+              <a:rPr lang="en-US" dirty="0"/>
+              <a:t> </a:t>
+            </a:r>
+          </a:p>
+        </p:txBody>
+      </p:sp>
+      <p:sp>
+        <p:nvSpPr>
+          <p:cNvPr id="49" name="TextBox 48">
+            <a:extLst>
+              <a:ext uri="{FF2B5EF4-FFF2-40B4-BE49-F238E27FC236}">
+                <a16:creationId xmlns:a16="http://schemas.microsoft.com/office/drawing/2014/main" id="{B91ABA8E-0738-4E04-8C1A-7E4AFD5EA6E8}"/>
+              </a:ext>
+            </a:extLst>
+          </p:cNvPr>
+          <p:cNvSpPr txBox="1"/>
+          <p:nvPr/>
+        </p:nvSpPr>
+        <p:spPr>
+          <a:xfrm>
+            <a:off x="2234292" y="2833006"/>
+            <a:ext cx="2743200" cy="523220"/>
+          </a:xfrm>
+          <a:prstGeom prst="rect">
+            <a:avLst/>
+          </a:prstGeom>
+          <a:noFill/>
+        </p:spPr>
+        <p:txBody>
+          <a:bodyPr rot="0" spcFirstLastPara="0" vertOverflow="overflow" horzOverflow="overflow" vert="horz" wrap="square" lIns="91440" tIns="45720" rIns="91440" bIns="45720" numCol="1" spcCol="0" rtlCol="0" fromWordArt="0" anchor="t" anchorCtr="0" forceAA="0" compatLnSpc="1">
+            <a:prstTxWarp prst="textNoShape">
+              <a:avLst/>
+            </a:prstTxWarp>
+            <a:spAutoFit/>
+          </a:bodyPr>
+          <a:lstStyle/>
+          <a:p>
+            <a:r>
+              <a:rPr lang="en-US" sz="1400" dirty="0" err="1"/>
+              <a:t>Reclamacoes</a:t>
+            </a:r>
+            <a:r>
+              <a:rPr lang="en-US" sz="1400" dirty="0"/>
+              <a:t> de </a:t>
+            </a:r>
+            <a:r>
+              <a:rPr lang="en-US" sz="1400" dirty="0" err="1"/>
+              <a:t>Policiais</a:t>
+            </a:r>
+            <a:r>
+              <a:rPr lang="en-US" sz="1400" dirty="0"/>
+              <a:t>  e de </a:t>
+            </a:r>
+            <a:r>
+              <a:rPr lang="en-US" sz="1400" dirty="0" err="1"/>
+              <a:t>quem</a:t>
+            </a:r>
+            <a:r>
+              <a:rPr lang="en-US" sz="1400" dirty="0"/>
+              <a:t> </a:t>
+            </a:r>
+            <a:r>
+              <a:rPr lang="en-US" sz="1400" dirty="0" err="1"/>
+              <a:t>nao</a:t>
+            </a:r>
+            <a:r>
+              <a:rPr lang="en-US" sz="1400" dirty="0"/>
+              <a:t> </a:t>
+            </a:r>
+            <a:r>
+              <a:rPr lang="en-US" sz="1400" dirty="0" err="1"/>
+              <a:t>gosta</a:t>
+            </a:r>
+            <a:r>
+              <a:rPr lang="en-US" sz="1400" dirty="0"/>
+              <a:t> do </a:t>
+            </a:r>
+            <a:r>
+              <a:rPr lang="en-US" sz="1400" dirty="0" err="1"/>
+              <a:t>trabalho</a:t>
+            </a:r>
+            <a:endParaRPr lang="en-US" sz="1400" dirty="0"/>
+          </a:p>
+        </p:txBody>
+      </p:sp>
+      <p:sp>
+        <p:nvSpPr>
+          <p:cNvPr id="50" name="TextBox 49">
+            <a:extLst>
+              <a:ext uri="{FF2B5EF4-FFF2-40B4-BE49-F238E27FC236}">
+                <a16:creationId xmlns:a16="http://schemas.microsoft.com/office/drawing/2014/main" id="{04208F6F-BA67-49EC-AF85-1D4941F76A9B}"/>
+              </a:ext>
+            </a:extLst>
+          </p:cNvPr>
+          <p:cNvSpPr txBox="1"/>
+          <p:nvPr/>
+        </p:nvSpPr>
+        <p:spPr>
+          <a:xfrm>
+            <a:off x="2234293" y="3880757"/>
+            <a:ext cx="2743200" cy="369332"/>
+          </a:xfrm>
+          <a:prstGeom prst="rect">
+            <a:avLst/>
+          </a:prstGeom>
+          <a:noFill/>
+        </p:spPr>
+        <p:txBody>
+          <a:bodyPr rot="0" spcFirstLastPara="0" vertOverflow="overflow" horzOverflow="overflow" vert="horz" wrap="square" lIns="91440" tIns="45720" rIns="91440" bIns="45720" numCol="1" spcCol="0" rtlCol="0" fromWordArt="0" anchor="t" anchorCtr="0" forceAA="0" compatLnSpc="1">
+            <a:prstTxWarp prst="textNoShape">
+              <a:avLst/>
+            </a:prstTxWarp>
+            <a:spAutoFit/>
+          </a:bodyPr>
+          <a:lstStyle/>
+          <a:p>
+            <a:r>
+              <a:rPr lang="en-US" dirty="0"/>
+              <a:t>Radio</a:t>
+            </a:r>
+          </a:p>
+        </p:txBody>
+      </p:sp>
+      <p:sp>
+        <p:nvSpPr>
+          <p:cNvPr id="51" name="TextBox 50">
+            <a:extLst>
+              <a:ext uri="{FF2B5EF4-FFF2-40B4-BE49-F238E27FC236}">
+                <a16:creationId xmlns:a16="http://schemas.microsoft.com/office/drawing/2014/main" id="{DCE0A53F-E676-4983-8E39-FAED78B00158}"/>
+              </a:ext>
+            </a:extLst>
+          </p:cNvPr>
+          <p:cNvSpPr txBox="1"/>
+          <p:nvPr/>
+        </p:nvSpPr>
+        <p:spPr>
+          <a:xfrm>
+            <a:off x="4504118" y="4544426"/>
+            <a:ext cx="1334219" cy="646331"/>
+          </a:xfrm>
+          <a:prstGeom prst="rect">
+            <a:avLst/>
+          </a:prstGeom>
+          <a:noFill/>
+        </p:spPr>
+        <p:txBody>
+          <a:bodyPr rot="0" spcFirstLastPara="0" vertOverflow="overflow" horzOverflow="overflow" vert="horz" wrap="square" lIns="91440" tIns="45720" rIns="91440" bIns="45720" numCol="1" spcCol="0" rtlCol="0" fromWordArt="0" anchor="t" anchorCtr="0" forceAA="0" compatLnSpc="1">
+            <a:prstTxWarp prst="textNoShape">
+              <a:avLst/>
+            </a:prstTxWarp>
+            <a:spAutoFit/>
+          </a:bodyPr>
+          <a:lstStyle/>
+          <a:p>
+            <a:r>
+              <a:rPr lang="en-US" dirty="0" err="1"/>
+              <a:t>Compra</a:t>
+            </a:r>
+            <a:r>
+              <a:rPr lang="en-US" dirty="0"/>
+              <a:t> </a:t>
+            </a:r>
+            <a:r>
+              <a:rPr lang="en-US" dirty="0" err="1"/>
+              <a:t>Presentes</a:t>
+            </a:r>
           </a:p>
         </p:txBody>
       </p:sp>
     </p:spTree>
     <p:extLst>
       <p:ext uri="{BB962C8B-B14F-4D97-AF65-F5344CB8AC3E}">
-        <p14:creationId xmlns:p14="http://schemas.microsoft.com/office/powerpoint/2010/main" val="3216955079"/>
+        <p14:creationId xmlns:p14="http://schemas.microsoft.com/office/powerpoint/2010/main" val="3125218009"/>
       </p:ext>
     </p:extLst>
   </p:cSld>
@@ -16214,13 +17494,13 @@
 
 <file path=customXml/item1.xml><?xml version="1.0" encoding="utf-8"?>
 <Control xmlns="http://schemas.microsoft.com/VisualStudio/2011/storyboarding/control">
-  <Id Name="System.Storyboarding.Common.Button" Revision="1" Stencil="System.Storyboarding.Common" StencilVersion="0.1"/>
+  <Id Name="System.Storyboarding.Common.MousePointer" Revision="1" Stencil="System.Storyboarding.Common" StencilVersion="0.1"/>
 </Control>
 </file>
 
 <file path=customXml/item2.xml><?xml version="1.0" encoding="utf-8"?>
 <Control xmlns="http://schemas.microsoft.com/VisualStudio/2011/storyboarding/control">
-  <Id Name="System.Storyboarding.Common.MousePointer" Revision="1" Stencil="System.Storyboarding.Common" StencilVersion="0.1"/>
+  <Id Name="System.Storyboarding.Common.Button" Revision="1" Stencil="System.Storyboarding.Common" StencilVersion="0.1"/>
 </Control>
 </file>
 
@@ -16231,7 +17511,7 @@
 </file>
 
 <file path=customXml/itemProps1.xml><?xml version="1.0" encoding="utf-8"?>
-<ds:datastoreItem xmlns:ds="http://schemas.openxmlformats.org/officeDocument/2006/customXml" ds:itemID="{89972C15-A741-472E-B305-DD97487358F0}">
+<ds:datastoreItem xmlns:ds="http://schemas.openxmlformats.org/officeDocument/2006/customXml" ds:itemID="{817C9E37-650B-4CCF-B951-DE51C8217DA2}">
   <ds:schemaRefs>
     <ds:schemaRef ds:uri="http://schemas.microsoft.com/VisualStudio/2011/storyboarding/control"/>
   </ds:schemaRefs>
@@ -16239,7 +17519,7 @@
 </file>
 
 <file path=customXml/itemProps2.xml><?xml version="1.0" encoding="utf-8"?>
-<ds:datastoreItem xmlns:ds="http://schemas.openxmlformats.org/officeDocument/2006/customXml" ds:itemID="{817C9E37-650B-4CCF-B951-DE51C8217DA2}">
+<ds:datastoreItem xmlns:ds="http://schemas.openxmlformats.org/officeDocument/2006/customXml" ds:itemID="{89972C15-A741-472E-B305-DD97487358F0}">
   <ds:schemaRefs>
     <ds:schemaRef ds:uri="http://schemas.microsoft.com/VisualStudio/2011/storyboarding/control"/>
   </ds:schemaRefs>

</xml_diff>